<commit_message>
add heel rest manual
</commit_message>
<xml_diff>
--- a/Document/Brake.pptx
+++ b/Document/Brake.pptx
@@ -154,10 +154,9 @@
           </a:lstStyle>
           <a:p>
             <a:r>
-              <a:rPr lang="en-US" smtClean="0"/>
+              <a:rPr lang="en-US"/>
               <a:t>Click to edit Master title style</a:t>
             </a:r>
-            <a:endParaRPr lang="en-US"/>
           </a:p>
         </p:txBody>
       </p:sp>
@@ -219,10 +218,9 @@
           </a:lstStyle>
           <a:p>
             <a:r>
-              <a:rPr lang="en-US" smtClean="0"/>
+              <a:rPr lang="en-US"/>
               <a:t>Click to edit Master subtitle style</a:t>
             </a:r>
-            <a:endParaRPr lang="en-US"/>
           </a:p>
         </p:txBody>
       </p:sp>
@@ -243,7 +241,7 @@
           <a:p>
             <a:fld id="{A0621FAC-4D6E-4703-AF31-6CD6DEE7B543}" type="datetimeFigureOut">
               <a:rPr lang="en-US" smtClean="0"/>
-              <a:t>3/27/2022</a:t>
+              <a:t>3/31/2022</a:t>
             </a:fld>
             <a:endParaRPr lang="en-US"/>
           </a:p>
@@ -337,10 +335,9 @@
           <a:lstStyle/>
           <a:p>
             <a:r>
-              <a:rPr lang="en-US" smtClean="0"/>
+              <a:rPr lang="en-US"/>
               <a:t>Click to edit Master title style</a:t>
             </a:r>
-            <a:endParaRPr lang="en-US"/>
           </a:p>
         </p:txBody>
       </p:sp>
@@ -361,38 +358,37 @@
           <a:p>
             <a:pPr lvl="0"/>
             <a:r>
-              <a:rPr lang="en-US" smtClean="0"/>
+              <a:rPr lang="en-US"/>
               <a:t>Edit Master text styles</a:t>
             </a:r>
           </a:p>
           <a:p>
             <a:pPr lvl="1"/>
             <a:r>
-              <a:rPr lang="en-US" smtClean="0"/>
+              <a:rPr lang="en-US"/>
               <a:t>Second level</a:t>
             </a:r>
           </a:p>
           <a:p>
             <a:pPr lvl="2"/>
             <a:r>
-              <a:rPr lang="en-US" smtClean="0"/>
+              <a:rPr lang="en-US"/>
               <a:t>Third level</a:t>
             </a:r>
           </a:p>
           <a:p>
             <a:pPr lvl="3"/>
             <a:r>
-              <a:rPr lang="en-US" smtClean="0"/>
+              <a:rPr lang="en-US"/>
               <a:t>Fourth level</a:t>
             </a:r>
           </a:p>
           <a:p>
             <a:pPr lvl="4"/>
             <a:r>
-              <a:rPr lang="en-US" smtClean="0"/>
+              <a:rPr lang="en-US"/>
               <a:t>Fifth level</a:t>
             </a:r>
-            <a:endParaRPr lang="en-US"/>
           </a:p>
         </p:txBody>
       </p:sp>
@@ -413,7 +409,7 @@
           <a:p>
             <a:fld id="{A0621FAC-4D6E-4703-AF31-6CD6DEE7B543}" type="datetimeFigureOut">
               <a:rPr lang="en-US" smtClean="0"/>
-              <a:t>3/27/2022</a:t>
+              <a:t>3/31/2022</a:t>
             </a:fld>
             <a:endParaRPr lang="en-US"/>
           </a:p>
@@ -512,10 +508,9 @@
           <a:lstStyle/>
           <a:p>
             <a:r>
-              <a:rPr lang="en-US" smtClean="0"/>
+              <a:rPr lang="en-US"/>
               <a:t>Click to edit Master title style</a:t>
             </a:r>
-            <a:endParaRPr lang="en-US"/>
           </a:p>
         </p:txBody>
       </p:sp>
@@ -541,38 +536,37 @@
           <a:p>
             <a:pPr lvl="0"/>
             <a:r>
-              <a:rPr lang="en-US" smtClean="0"/>
+              <a:rPr lang="en-US"/>
               <a:t>Edit Master text styles</a:t>
             </a:r>
           </a:p>
           <a:p>
             <a:pPr lvl="1"/>
             <a:r>
-              <a:rPr lang="en-US" smtClean="0"/>
+              <a:rPr lang="en-US"/>
               <a:t>Second level</a:t>
             </a:r>
           </a:p>
           <a:p>
             <a:pPr lvl="2"/>
             <a:r>
-              <a:rPr lang="en-US" smtClean="0"/>
+              <a:rPr lang="en-US"/>
               <a:t>Third level</a:t>
             </a:r>
           </a:p>
           <a:p>
             <a:pPr lvl="3"/>
             <a:r>
-              <a:rPr lang="en-US" smtClean="0"/>
+              <a:rPr lang="en-US"/>
               <a:t>Fourth level</a:t>
             </a:r>
           </a:p>
           <a:p>
             <a:pPr lvl="4"/>
             <a:r>
-              <a:rPr lang="en-US" smtClean="0"/>
+              <a:rPr lang="en-US"/>
               <a:t>Fifth level</a:t>
             </a:r>
-            <a:endParaRPr lang="en-US"/>
           </a:p>
         </p:txBody>
       </p:sp>
@@ -593,7 +587,7 @@
           <a:p>
             <a:fld id="{A0621FAC-4D6E-4703-AF31-6CD6DEE7B543}" type="datetimeFigureOut">
               <a:rPr lang="en-US" smtClean="0"/>
-              <a:t>3/27/2022</a:t>
+              <a:t>3/31/2022</a:t>
             </a:fld>
             <a:endParaRPr lang="en-US"/>
           </a:p>
@@ -687,10 +681,9 @@
           <a:lstStyle/>
           <a:p>
             <a:r>
-              <a:rPr lang="en-US" smtClean="0"/>
+              <a:rPr lang="en-US"/>
               <a:t>Click to edit Master title style</a:t>
             </a:r>
-            <a:endParaRPr lang="en-US"/>
           </a:p>
         </p:txBody>
       </p:sp>
@@ -711,38 +704,37 @@
           <a:p>
             <a:pPr lvl="0"/>
             <a:r>
-              <a:rPr lang="en-US" smtClean="0"/>
+              <a:rPr lang="en-US"/>
               <a:t>Edit Master text styles</a:t>
             </a:r>
           </a:p>
           <a:p>
             <a:pPr lvl="1"/>
             <a:r>
-              <a:rPr lang="en-US" smtClean="0"/>
+              <a:rPr lang="en-US"/>
               <a:t>Second level</a:t>
             </a:r>
           </a:p>
           <a:p>
             <a:pPr lvl="2"/>
             <a:r>
-              <a:rPr lang="en-US" smtClean="0"/>
+              <a:rPr lang="en-US"/>
               <a:t>Third level</a:t>
             </a:r>
           </a:p>
           <a:p>
             <a:pPr lvl="3"/>
             <a:r>
-              <a:rPr lang="en-US" smtClean="0"/>
+              <a:rPr lang="en-US"/>
               <a:t>Fourth level</a:t>
             </a:r>
           </a:p>
           <a:p>
             <a:pPr lvl="4"/>
             <a:r>
-              <a:rPr lang="en-US" smtClean="0"/>
+              <a:rPr lang="en-US"/>
               <a:t>Fifth level</a:t>
             </a:r>
-            <a:endParaRPr lang="en-US"/>
           </a:p>
         </p:txBody>
       </p:sp>
@@ -763,7 +755,7 @@
           <a:p>
             <a:fld id="{A0621FAC-4D6E-4703-AF31-6CD6DEE7B543}" type="datetimeFigureOut">
               <a:rPr lang="en-US" smtClean="0"/>
-              <a:t>3/27/2022</a:t>
+              <a:t>3/31/2022</a:t>
             </a:fld>
             <a:endParaRPr lang="en-US"/>
           </a:p>
@@ -866,10 +858,9 @@
           </a:lstStyle>
           <a:p>
             <a:r>
-              <a:rPr lang="en-US" smtClean="0"/>
+              <a:rPr lang="en-US"/>
               <a:t>Click to edit Master title style</a:t>
             </a:r>
-            <a:endParaRPr lang="en-US"/>
           </a:p>
         </p:txBody>
       </p:sp>
@@ -986,7 +977,7 @@
           <a:p>
             <a:pPr lvl="0"/>
             <a:r>
-              <a:rPr lang="en-US" smtClean="0"/>
+              <a:rPr lang="en-US"/>
               <a:t>Edit Master text styles</a:t>
             </a:r>
           </a:p>
@@ -1009,7 +1000,7 @@
           <a:p>
             <a:fld id="{A0621FAC-4D6E-4703-AF31-6CD6DEE7B543}" type="datetimeFigureOut">
               <a:rPr lang="en-US" smtClean="0"/>
-              <a:t>3/27/2022</a:t>
+              <a:t>3/31/2022</a:t>
             </a:fld>
             <a:endParaRPr lang="en-US"/>
           </a:p>
@@ -1103,10 +1094,9 @@
           <a:lstStyle/>
           <a:p>
             <a:r>
-              <a:rPr lang="en-US" smtClean="0"/>
+              <a:rPr lang="en-US"/>
               <a:t>Click to edit Master title style</a:t>
             </a:r>
-            <a:endParaRPr lang="en-US"/>
           </a:p>
         </p:txBody>
       </p:sp>
@@ -1132,38 +1122,37 @@
           <a:p>
             <a:pPr lvl="0"/>
             <a:r>
-              <a:rPr lang="en-US" smtClean="0"/>
+              <a:rPr lang="en-US"/>
               <a:t>Edit Master text styles</a:t>
             </a:r>
           </a:p>
           <a:p>
             <a:pPr lvl="1"/>
             <a:r>
-              <a:rPr lang="en-US" smtClean="0"/>
+              <a:rPr lang="en-US"/>
               <a:t>Second level</a:t>
             </a:r>
           </a:p>
           <a:p>
             <a:pPr lvl="2"/>
             <a:r>
-              <a:rPr lang="en-US" smtClean="0"/>
+              <a:rPr lang="en-US"/>
               <a:t>Third level</a:t>
             </a:r>
           </a:p>
           <a:p>
             <a:pPr lvl="3"/>
             <a:r>
-              <a:rPr lang="en-US" smtClean="0"/>
+              <a:rPr lang="en-US"/>
               <a:t>Fourth level</a:t>
             </a:r>
           </a:p>
           <a:p>
             <a:pPr lvl="4"/>
             <a:r>
-              <a:rPr lang="en-US" smtClean="0"/>
+              <a:rPr lang="en-US"/>
               <a:t>Fifth level</a:t>
             </a:r>
-            <a:endParaRPr lang="en-US"/>
           </a:p>
         </p:txBody>
       </p:sp>
@@ -1189,38 +1178,37 @@
           <a:p>
             <a:pPr lvl="0"/>
             <a:r>
-              <a:rPr lang="en-US" smtClean="0"/>
+              <a:rPr lang="en-US"/>
               <a:t>Edit Master text styles</a:t>
             </a:r>
           </a:p>
           <a:p>
             <a:pPr lvl="1"/>
             <a:r>
-              <a:rPr lang="en-US" smtClean="0"/>
+              <a:rPr lang="en-US"/>
               <a:t>Second level</a:t>
             </a:r>
           </a:p>
           <a:p>
             <a:pPr lvl="2"/>
             <a:r>
-              <a:rPr lang="en-US" smtClean="0"/>
+              <a:rPr lang="en-US"/>
               <a:t>Third level</a:t>
             </a:r>
           </a:p>
           <a:p>
             <a:pPr lvl="3"/>
             <a:r>
-              <a:rPr lang="en-US" smtClean="0"/>
+              <a:rPr lang="en-US"/>
               <a:t>Fourth level</a:t>
             </a:r>
           </a:p>
           <a:p>
             <a:pPr lvl="4"/>
             <a:r>
-              <a:rPr lang="en-US" smtClean="0"/>
+              <a:rPr lang="en-US"/>
               <a:t>Fifth level</a:t>
             </a:r>
-            <a:endParaRPr lang="en-US"/>
           </a:p>
         </p:txBody>
       </p:sp>
@@ -1241,7 +1229,7 @@
           <a:p>
             <a:fld id="{A0621FAC-4D6E-4703-AF31-6CD6DEE7B543}" type="datetimeFigureOut">
               <a:rPr lang="en-US" smtClean="0"/>
-              <a:t>3/27/2022</a:t>
+              <a:t>3/31/2022</a:t>
             </a:fld>
             <a:endParaRPr lang="en-US"/>
           </a:p>
@@ -1340,10 +1328,9 @@
           <a:lstStyle/>
           <a:p>
             <a:r>
-              <a:rPr lang="en-US" smtClean="0"/>
+              <a:rPr lang="en-US"/>
               <a:t>Click to edit Master title style</a:t>
             </a:r>
-            <a:endParaRPr lang="en-US"/>
           </a:p>
         </p:txBody>
       </p:sp>
@@ -1406,7 +1393,7 @@
           <a:p>
             <a:pPr lvl="0"/>
             <a:r>
-              <a:rPr lang="en-US" smtClean="0"/>
+              <a:rPr lang="en-US"/>
               <a:t>Edit Master text styles</a:t>
             </a:r>
           </a:p>
@@ -1434,38 +1421,37 @@
           <a:p>
             <a:pPr lvl="0"/>
             <a:r>
-              <a:rPr lang="en-US" smtClean="0"/>
+              <a:rPr lang="en-US"/>
               <a:t>Edit Master text styles</a:t>
             </a:r>
           </a:p>
           <a:p>
             <a:pPr lvl="1"/>
             <a:r>
-              <a:rPr lang="en-US" smtClean="0"/>
+              <a:rPr lang="en-US"/>
               <a:t>Second level</a:t>
             </a:r>
           </a:p>
           <a:p>
             <a:pPr lvl="2"/>
             <a:r>
-              <a:rPr lang="en-US" smtClean="0"/>
+              <a:rPr lang="en-US"/>
               <a:t>Third level</a:t>
             </a:r>
           </a:p>
           <a:p>
             <a:pPr lvl="3"/>
             <a:r>
-              <a:rPr lang="en-US" smtClean="0"/>
+              <a:rPr lang="en-US"/>
               <a:t>Fourth level</a:t>
             </a:r>
           </a:p>
           <a:p>
             <a:pPr lvl="4"/>
             <a:r>
-              <a:rPr lang="en-US" smtClean="0"/>
+              <a:rPr lang="en-US"/>
               <a:t>Fifth level</a:t>
             </a:r>
-            <a:endParaRPr lang="en-US"/>
           </a:p>
         </p:txBody>
       </p:sp>
@@ -1528,7 +1514,7 @@
           <a:p>
             <a:pPr lvl="0"/>
             <a:r>
-              <a:rPr lang="en-US" smtClean="0"/>
+              <a:rPr lang="en-US"/>
               <a:t>Edit Master text styles</a:t>
             </a:r>
           </a:p>
@@ -1556,38 +1542,37 @@
           <a:p>
             <a:pPr lvl="0"/>
             <a:r>
-              <a:rPr lang="en-US" smtClean="0"/>
+              <a:rPr lang="en-US"/>
               <a:t>Edit Master text styles</a:t>
             </a:r>
           </a:p>
           <a:p>
             <a:pPr lvl="1"/>
             <a:r>
-              <a:rPr lang="en-US" smtClean="0"/>
+              <a:rPr lang="en-US"/>
               <a:t>Second level</a:t>
             </a:r>
           </a:p>
           <a:p>
             <a:pPr lvl="2"/>
             <a:r>
-              <a:rPr lang="en-US" smtClean="0"/>
+              <a:rPr lang="en-US"/>
               <a:t>Third level</a:t>
             </a:r>
           </a:p>
           <a:p>
             <a:pPr lvl="3"/>
             <a:r>
-              <a:rPr lang="en-US" smtClean="0"/>
+              <a:rPr lang="en-US"/>
               <a:t>Fourth level</a:t>
             </a:r>
           </a:p>
           <a:p>
             <a:pPr lvl="4"/>
             <a:r>
-              <a:rPr lang="en-US" smtClean="0"/>
+              <a:rPr lang="en-US"/>
               <a:t>Fifth level</a:t>
             </a:r>
-            <a:endParaRPr lang="en-US"/>
           </a:p>
         </p:txBody>
       </p:sp>
@@ -1608,7 +1593,7 @@
           <a:p>
             <a:fld id="{A0621FAC-4D6E-4703-AF31-6CD6DEE7B543}" type="datetimeFigureOut">
               <a:rPr lang="en-US" smtClean="0"/>
-              <a:t>3/27/2022</a:t>
+              <a:t>3/31/2022</a:t>
             </a:fld>
             <a:endParaRPr lang="en-US"/>
           </a:p>
@@ -1702,10 +1687,9 @@
           <a:lstStyle/>
           <a:p>
             <a:r>
-              <a:rPr lang="en-US" smtClean="0"/>
+              <a:rPr lang="en-US"/>
               <a:t>Click to edit Master title style</a:t>
             </a:r>
-            <a:endParaRPr lang="en-US"/>
           </a:p>
         </p:txBody>
       </p:sp>
@@ -1726,7 +1710,7 @@
           <a:p>
             <a:fld id="{A0621FAC-4D6E-4703-AF31-6CD6DEE7B543}" type="datetimeFigureOut">
               <a:rPr lang="en-US" smtClean="0"/>
-              <a:t>3/27/2022</a:t>
+              <a:t>3/31/2022</a:t>
             </a:fld>
             <a:endParaRPr lang="en-US"/>
           </a:p>
@@ -1821,7 +1805,7 @@
           <a:p>
             <a:fld id="{A0621FAC-4D6E-4703-AF31-6CD6DEE7B543}" type="datetimeFigureOut">
               <a:rPr lang="en-US" smtClean="0"/>
-              <a:t>3/27/2022</a:t>
+              <a:t>3/31/2022</a:t>
             </a:fld>
             <a:endParaRPr lang="en-US"/>
           </a:p>
@@ -1924,10 +1908,9 @@
           </a:lstStyle>
           <a:p>
             <a:r>
-              <a:rPr lang="en-US" smtClean="0"/>
+              <a:rPr lang="en-US"/>
               <a:t>Click to edit Master title style</a:t>
             </a:r>
-            <a:endParaRPr lang="en-US"/>
           </a:p>
         </p:txBody>
       </p:sp>
@@ -1981,38 +1964,37 @@
           <a:p>
             <a:pPr lvl="0"/>
             <a:r>
-              <a:rPr lang="en-US" smtClean="0"/>
+              <a:rPr lang="en-US"/>
               <a:t>Edit Master text styles</a:t>
             </a:r>
           </a:p>
           <a:p>
             <a:pPr lvl="1"/>
             <a:r>
-              <a:rPr lang="en-US" smtClean="0"/>
+              <a:rPr lang="en-US"/>
               <a:t>Second level</a:t>
             </a:r>
           </a:p>
           <a:p>
             <a:pPr lvl="2"/>
             <a:r>
-              <a:rPr lang="en-US" smtClean="0"/>
+              <a:rPr lang="en-US"/>
               <a:t>Third level</a:t>
             </a:r>
           </a:p>
           <a:p>
             <a:pPr lvl="3"/>
             <a:r>
-              <a:rPr lang="en-US" smtClean="0"/>
+              <a:rPr lang="en-US"/>
               <a:t>Fourth level</a:t>
             </a:r>
           </a:p>
           <a:p>
             <a:pPr lvl="4"/>
             <a:r>
-              <a:rPr lang="en-US" smtClean="0"/>
+              <a:rPr lang="en-US"/>
               <a:t>Fifth level</a:t>
             </a:r>
-            <a:endParaRPr lang="en-US"/>
           </a:p>
         </p:txBody>
       </p:sp>
@@ -2075,7 +2057,7 @@
           <a:p>
             <a:pPr lvl="0"/>
             <a:r>
-              <a:rPr lang="en-US" smtClean="0"/>
+              <a:rPr lang="en-US"/>
               <a:t>Edit Master text styles</a:t>
             </a:r>
           </a:p>
@@ -2098,7 +2080,7 @@
           <a:p>
             <a:fld id="{A0621FAC-4D6E-4703-AF31-6CD6DEE7B543}" type="datetimeFigureOut">
               <a:rPr lang="en-US" smtClean="0"/>
-              <a:t>3/27/2022</a:t>
+              <a:t>3/31/2022</a:t>
             </a:fld>
             <a:endParaRPr lang="en-US"/>
           </a:p>
@@ -2201,10 +2183,9 @@
           </a:lstStyle>
           <a:p>
             <a:r>
-              <a:rPr lang="en-US" smtClean="0"/>
+              <a:rPr lang="en-US"/>
               <a:t>Click to edit Master title style</a:t>
             </a:r>
-            <a:endParaRPr lang="en-US"/>
           </a:p>
         </p:txBody>
       </p:sp>
@@ -2328,7 +2309,7 @@
           <a:p>
             <a:pPr lvl="0"/>
             <a:r>
-              <a:rPr lang="en-US" smtClean="0"/>
+              <a:rPr lang="en-US"/>
               <a:t>Edit Master text styles</a:t>
             </a:r>
           </a:p>
@@ -2351,7 +2332,7 @@
           <a:p>
             <a:fld id="{A0621FAC-4D6E-4703-AF31-6CD6DEE7B543}" type="datetimeFigureOut">
               <a:rPr lang="en-US" smtClean="0"/>
-              <a:t>3/27/2022</a:t>
+              <a:t>3/31/2022</a:t>
             </a:fld>
             <a:endParaRPr lang="en-US"/>
           </a:p>
@@ -2460,10 +2441,9 @@
           <a:lstStyle/>
           <a:p>
             <a:r>
-              <a:rPr lang="en-US" smtClean="0"/>
+              <a:rPr lang="en-US"/>
               <a:t>Click to edit Master title style</a:t>
             </a:r>
-            <a:endParaRPr lang="en-US"/>
           </a:p>
         </p:txBody>
       </p:sp>
@@ -2494,38 +2474,37 @@
           <a:p>
             <a:pPr lvl="0"/>
             <a:r>
-              <a:rPr lang="en-US" smtClean="0"/>
+              <a:rPr lang="en-US"/>
               <a:t>Edit Master text styles</a:t>
             </a:r>
           </a:p>
           <a:p>
             <a:pPr lvl="1"/>
             <a:r>
-              <a:rPr lang="en-US" smtClean="0"/>
+              <a:rPr lang="en-US"/>
               <a:t>Second level</a:t>
             </a:r>
           </a:p>
           <a:p>
             <a:pPr lvl="2"/>
             <a:r>
-              <a:rPr lang="en-US" smtClean="0"/>
+              <a:rPr lang="en-US"/>
               <a:t>Third level</a:t>
             </a:r>
           </a:p>
           <a:p>
             <a:pPr lvl="3"/>
             <a:r>
-              <a:rPr lang="en-US" smtClean="0"/>
+              <a:rPr lang="en-US"/>
               <a:t>Fourth level</a:t>
             </a:r>
           </a:p>
           <a:p>
             <a:pPr lvl="4"/>
             <a:r>
-              <a:rPr lang="en-US" smtClean="0"/>
+              <a:rPr lang="en-US"/>
               <a:t>Fifth level</a:t>
             </a:r>
-            <a:endParaRPr lang="en-US"/>
           </a:p>
         </p:txBody>
       </p:sp>
@@ -2564,7 +2543,7 @@
           <a:p>
             <a:fld id="{A0621FAC-4D6E-4703-AF31-6CD6DEE7B543}" type="datetimeFigureOut">
               <a:rPr lang="en-US" smtClean="0"/>
-              <a:t>3/27/2022</a:t>
+              <a:t>3/31/2022</a:t>
             </a:fld>
             <a:endParaRPr lang="en-US"/>
           </a:p>
@@ -2992,12 +2971,83 @@
           <a:lstStyle/>
           <a:p>
             <a:r>
-              <a:rPr lang="en-US" sz="1200" b="1" dirty="0" smtClean="0">
+              <a:rPr lang="en-US" sz="1200" b="1" dirty="0">
                 <a:latin typeface="Arial" panose="020B0604020202020204" pitchFamily="34" charset="0"/>
                 <a:cs typeface="Arial" panose="020B0604020202020204" pitchFamily="34" charset="0"/>
               </a:rPr>
               <a:t>Step 1: Remove the elastomer stack</a:t>
             </a:r>
+          </a:p>
+        </p:txBody>
+      </p:sp>
+      <p:sp>
+        <p:nvSpPr>
+          <p:cNvPr id="26" name="TextBox 25"/>
+          <p:cNvSpPr txBox="1"/>
+          <p:nvPr/>
+        </p:nvSpPr>
+        <p:spPr>
+          <a:xfrm>
+            <a:off x="4822217" y="-36206"/>
+            <a:ext cx="2312995" cy="646331"/>
+          </a:xfrm>
+          <a:prstGeom prst="rect">
+            <a:avLst/>
+          </a:prstGeom>
+          <a:noFill/>
+        </p:spPr>
+        <p:txBody>
+          <a:bodyPr wrap="square" rtlCol="0">
+            <a:spAutoFit/>
+          </a:bodyPr>
+          <a:lstStyle/>
+          <a:p>
+            <a:r>
+              <a:rPr lang="en-US" sz="1200" b="1" dirty="0">
+                <a:latin typeface="Arial" panose="020B0604020202020204" pitchFamily="34" charset="0"/>
+                <a:cs typeface="Arial" panose="020B0604020202020204" pitchFamily="34" charset="0"/>
+              </a:rPr>
+              <a:t>Step 2: Choose a suitable combination of springs and elastomers</a:t>
+            </a:r>
+          </a:p>
+        </p:txBody>
+      </p:sp>
+      <p:sp>
+        <p:nvSpPr>
+          <p:cNvPr id="28" name="TextBox 27"/>
+          <p:cNvSpPr txBox="1"/>
+          <p:nvPr/>
+        </p:nvSpPr>
+        <p:spPr>
+          <a:xfrm>
+            <a:off x="7082884" y="-37509"/>
+            <a:ext cx="2419887" cy="276999"/>
+          </a:xfrm>
+          <a:prstGeom prst="rect">
+            <a:avLst/>
+          </a:prstGeom>
+          <a:noFill/>
+        </p:spPr>
+        <p:txBody>
+          <a:bodyPr wrap="square" rtlCol="0">
+            <a:spAutoFit/>
+          </a:bodyPr>
+          <a:lstStyle/>
+          <a:p>
+            <a:r>
+              <a:rPr lang="en-US" sz="1200" b="1" dirty="0">
+                <a:latin typeface="Arial" panose="020B0604020202020204" pitchFamily="34" charset="0"/>
+                <a:cs typeface="Arial" panose="020B0604020202020204" pitchFamily="34" charset="0"/>
+              </a:rPr>
+              <a:t>Step 3: Remove the </a:t>
+            </a:r>
+            <a:r>
+              <a:rPr lang="en-US" sz="1200" b="1" dirty="0" err="1">
+                <a:latin typeface="Arial" panose="020B0604020202020204" pitchFamily="34" charset="0"/>
+                <a:cs typeface="Arial" panose="020B0604020202020204" pitchFamily="34" charset="0"/>
+              </a:rPr>
+              <a:t>bumpstop</a:t>
+            </a:r>
             <a:endParaRPr lang="en-US" sz="1200" b="1" dirty="0">
               <a:latin typeface="Arial" panose="020B0604020202020204" pitchFamily="34" charset="0"/>
               <a:cs typeface="Arial" panose="020B0604020202020204" pitchFamily="34" charset="0"/>
@@ -3007,14 +3057,14 @@
       </p:sp>
       <p:sp>
         <p:nvSpPr>
-          <p:cNvPr id="26" name="TextBox 25"/>
+          <p:cNvPr id="30" name="TextBox 29"/>
           <p:cNvSpPr txBox="1"/>
           <p:nvPr/>
         </p:nvSpPr>
         <p:spPr>
           <a:xfrm>
-            <a:off x="4822217" y="-36206"/>
-            <a:ext cx="2312995" cy="646331"/>
+            <a:off x="9724003" y="3656915"/>
+            <a:ext cx="2131256" cy="276999"/>
           </a:xfrm>
           <a:prstGeom prst="rect">
             <a:avLst/>
@@ -3027,40 +3077,66 @@
           </a:bodyPr>
           <a:lstStyle/>
           <a:p>
-            <a:r>
-              <a:rPr lang="en-US" sz="1200" b="1" dirty="0" smtClean="0">
-                <a:latin typeface="Arial" panose="020B0604020202020204" pitchFamily="34" charset="0"/>
-                <a:cs typeface="Arial" panose="020B0604020202020204" pitchFamily="34" charset="0"/>
-              </a:rPr>
-              <a:t>Step 2: Choose </a:t>
-            </a:r>
             <a:r>
               <a:rPr lang="en-US" sz="1200" b="1" dirty="0">
                 <a:latin typeface="Arial" panose="020B0604020202020204" pitchFamily="34" charset="0"/>
                 <a:cs typeface="Arial" panose="020B0604020202020204" pitchFamily="34" charset="0"/>
               </a:rPr>
-              <a:t>a </a:t>
-            </a:r>
-            <a:r>
-              <a:rPr lang="en-US" sz="1200" b="1" dirty="0" smtClean="0">
+              <a:t>Step 5: Adjust the damper</a:t>
+            </a:r>
+            <a:endParaRPr lang="en-US" sz="1000" b="1" dirty="0">
+              <a:latin typeface="Arial" panose="020B0604020202020204" pitchFamily="34" charset="0"/>
+              <a:cs typeface="Arial" panose="020B0604020202020204" pitchFamily="34" charset="0"/>
+            </a:endParaRPr>
+          </a:p>
+        </p:txBody>
+      </p:sp>
+      <p:sp>
+        <p:nvSpPr>
+          <p:cNvPr id="37" name="TextBox 36"/>
+          <p:cNvSpPr txBox="1"/>
+          <p:nvPr/>
+        </p:nvSpPr>
+        <p:spPr>
+          <a:xfrm>
+            <a:off x="6997045" y="3660689"/>
+            <a:ext cx="2302314" cy="461665"/>
+          </a:xfrm>
+          <a:prstGeom prst="rect">
+            <a:avLst/>
+          </a:prstGeom>
+          <a:noFill/>
+        </p:spPr>
+        <p:txBody>
+          <a:bodyPr wrap="square" rtlCol="0">
+            <a:spAutoFit/>
+          </a:bodyPr>
+          <a:lstStyle/>
+          <a:p>
+            <a:r>
+              <a:rPr lang="en-US" sz="1200" b="1" dirty="0">
                 <a:latin typeface="Arial" panose="020B0604020202020204" pitchFamily="34" charset="0"/>
                 <a:cs typeface="Arial" panose="020B0604020202020204" pitchFamily="34" charset="0"/>
               </a:rPr>
-              <a:t>suitable combination of springs and elastomers</a:t>
-            </a:r>
-          </a:p>
-        </p:txBody>
-      </p:sp>
-      <p:sp>
-        <p:nvSpPr>
-          <p:cNvPr id="28" name="TextBox 27"/>
+              <a:t>Step 6: Tighten the damper and remove the spacer</a:t>
+            </a:r>
+            <a:endParaRPr lang="en-US" sz="800" b="1" dirty="0">
+              <a:latin typeface="Arial" panose="020B0604020202020204" pitchFamily="34" charset="0"/>
+              <a:cs typeface="Arial" panose="020B0604020202020204" pitchFamily="34" charset="0"/>
+            </a:endParaRPr>
+          </a:p>
+        </p:txBody>
+      </p:sp>
+      <p:sp>
+        <p:nvSpPr>
+          <p:cNvPr id="39" name="TextBox 38"/>
           <p:cNvSpPr txBox="1"/>
           <p:nvPr/>
         </p:nvSpPr>
         <p:spPr>
           <a:xfrm>
-            <a:off x="7082884" y="-37509"/>
-            <a:ext cx="2419887" cy="276999"/>
+            <a:off x="4584630" y="3658645"/>
+            <a:ext cx="2487006" cy="461665"/>
           </a:xfrm>
           <a:prstGeom prst="rect">
             <a:avLst/>
@@ -3074,90 +3150,25 @@
           <a:lstStyle/>
           <a:p>
             <a:r>
-              <a:rPr lang="en-US" sz="1200" b="1" dirty="0" smtClean="0">
+              <a:rPr lang="en-US" sz="1200" b="1" dirty="0">
                 <a:latin typeface="Arial" panose="020B0604020202020204" pitchFamily="34" charset="0"/>
                 <a:cs typeface="Arial" panose="020B0604020202020204" pitchFamily="34" charset="0"/>
               </a:rPr>
-              <a:t>Step 3: Remove the </a:t>
-            </a:r>
-            <a:r>
-              <a:rPr lang="en-US" sz="1200" b="1" dirty="0" err="1" smtClean="0">
+              <a:t>Step 7: Re-install the </a:t>
+            </a:r>
+            <a:r>
+              <a:rPr lang="en-US" sz="1200" b="1" dirty="0" err="1">
                 <a:latin typeface="Arial" panose="020B0604020202020204" pitchFamily="34" charset="0"/>
                 <a:cs typeface="Arial" panose="020B0604020202020204" pitchFamily="34" charset="0"/>
               </a:rPr>
               <a:t>bumpstop</a:t>
             </a:r>
-            <a:endParaRPr lang="en-US" sz="1200" b="1" dirty="0">
-              <a:latin typeface="Arial" panose="020B0604020202020204" pitchFamily="34" charset="0"/>
-              <a:cs typeface="Arial" panose="020B0604020202020204" pitchFamily="34" charset="0"/>
-            </a:endParaRPr>
-          </a:p>
-        </p:txBody>
-      </p:sp>
-      <p:sp>
-        <p:nvSpPr>
-          <p:cNvPr id="30" name="TextBox 29"/>
-          <p:cNvSpPr txBox="1"/>
-          <p:nvPr/>
-        </p:nvSpPr>
-        <p:spPr>
-          <a:xfrm>
-            <a:off x="9724003" y="3656915"/>
-            <a:ext cx="2131256" cy="276999"/>
-          </a:xfrm>
-          <a:prstGeom prst="rect">
-            <a:avLst/>
-          </a:prstGeom>
-          <a:noFill/>
-        </p:spPr>
-        <p:txBody>
-          <a:bodyPr wrap="square" rtlCol="0">
-            <a:spAutoFit/>
-          </a:bodyPr>
-          <a:lstStyle/>
-          <a:p>
-            <a:r>
-              <a:rPr lang="en-US" sz="1200" b="1" dirty="0" smtClean="0">
+            <a:r>
+              <a:rPr lang="en-US" sz="1200" b="1" dirty="0">
                 <a:latin typeface="Arial" panose="020B0604020202020204" pitchFamily="34" charset="0"/>
                 <a:cs typeface="Arial" panose="020B0604020202020204" pitchFamily="34" charset="0"/>
               </a:rPr>
-              <a:t>Step 5: Adjust the damper</a:t>
-            </a:r>
-            <a:endParaRPr lang="en-US" sz="1000" b="1" dirty="0">
-              <a:latin typeface="Arial" panose="020B0604020202020204" pitchFamily="34" charset="0"/>
-              <a:cs typeface="Arial" panose="020B0604020202020204" pitchFamily="34" charset="0"/>
-            </a:endParaRPr>
-          </a:p>
-        </p:txBody>
-      </p:sp>
-      <p:sp>
-        <p:nvSpPr>
-          <p:cNvPr id="37" name="TextBox 36"/>
-          <p:cNvSpPr txBox="1"/>
-          <p:nvPr/>
-        </p:nvSpPr>
-        <p:spPr>
-          <a:xfrm>
-            <a:off x="6997045" y="3660689"/>
-            <a:ext cx="2302314" cy="461665"/>
-          </a:xfrm>
-          <a:prstGeom prst="rect">
-            <a:avLst/>
-          </a:prstGeom>
-          <a:noFill/>
-        </p:spPr>
-        <p:txBody>
-          <a:bodyPr wrap="square" rtlCol="0">
-            <a:spAutoFit/>
-          </a:bodyPr>
-          <a:lstStyle/>
-          <a:p>
-            <a:r>
-              <a:rPr lang="en-US" sz="1200" b="1" dirty="0" smtClean="0">
-                <a:latin typeface="Arial" panose="020B0604020202020204" pitchFamily="34" charset="0"/>
-                <a:cs typeface="Arial" panose="020B0604020202020204" pitchFamily="34" charset="0"/>
-              </a:rPr>
-              <a:t>Step 6: Tighten the damper and remove the spacer</a:t>
+              <a:t>.</a:t>
             </a:r>
             <a:endParaRPr lang="en-US" sz="800" b="1" dirty="0">
               <a:latin typeface="Arial" panose="020B0604020202020204" pitchFamily="34" charset="0"/>
@@ -3168,14 +3179,14 @@
       </p:sp>
       <p:sp>
         <p:nvSpPr>
-          <p:cNvPr id="39" name="TextBox 38"/>
+          <p:cNvPr id="67" name="TextBox 66"/>
           <p:cNvSpPr txBox="1"/>
           <p:nvPr/>
         </p:nvSpPr>
         <p:spPr>
           <a:xfrm>
-            <a:off x="4584630" y="3658645"/>
-            <a:ext cx="2487006" cy="461665"/>
+            <a:off x="9717211" y="-19475"/>
+            <a:ext cx="2207868" cy="276999"/>
           </a:xfrm>
           <a:prstGeom prst="rect">
             <a:avLst/>
@@ -3189,57 +3200,7 @@
           <a:lstStyle/>
           <a:p>
             <a:r>
-              <a:rPr lang="en-US" sz="1200" b="1" dirty="0" smtClean="0">
-                <a:latin typeface="Arial" panose="020B0604020202020204" pitchFamily="34" charset="0"/>
-                <a:cs typeface="Arial" panose="020B0604020202020204" pitchFamily="34" charset="0"/>
-              </a:rPr>
-              <a:t>Step 7: Re-install the </a:t>
-            </a:r>
-            <a:r>
-              <a:rPr lang="en-US" sz="1200" b="1" dirty="0" err="1" smtClean="0">
-                <a:latin typeface="Arial" panose="020B0604020202020204" pitchFamily="34" charset="0"/>
-                <a:cs typeface="Arial" panose="020B0604020202020204" pitchFamily="34" charset="0"/>
-              </a:rPr>
-              <a:t>bumpstop</a:t>
-            </a:r>
-            <a:r>
-              <a:rPr lang="en-US" sz="1200" b="1" dirty="0" smtClean="0">
-                <a:latin typeface="Arial" panose="020B0604020202020204" pitchFamily="34" charset="0"/>
-                <a:cs typeface="Arial" panose="020B0604020202020204" pitchFamily="34" charset="0"/>
-              </a:rPr>
-              <a:t>.</a:t>
-            </a:r>
-            <a:endParaRPr lang="en-US" sz="800" b="1" dirty="0">
-              <a:latin typeface="Arial" panose="020B0604020202020204" pitchFamily="34" charset="0"/>
-              <a:cs typeface="Arial" panose="020B0604020202020204" pitchFamily="34" charset="0"/>
-            </a:endParaRPr>
-          </a:p>
-        </p:txBody>
-      </p:sp>
-      <p:sp>
-        <p:nvSpPr>
-          <p:cNvPr id="67" name="TextBox 66"/>
-          <p:cNvSpPr txBox="1"/>
-          <p:nvPr/>
-        </p:nvSpPr>
-        <p:spPr>
-          <a:xfrm>
-            <a:off x="9717211" y="-19475"/>
-            <a:ext cx="2207868" cy="276999"/>
-          </a:xfrm>
-          <a:prstGeom prst="rect">
-            <a:avLst/>
-          </a:prstGeom>
-          <a:noFill/>
-        </p:spPr>
-        <p:txBody>
-          <a:bodyPr wrap="square" rtlCol="0">
-            <a:spAutoFit/>
-          </a:bodyPr>
-          <a:lstStyle/>
-          <a:p>
-            <a:r>
-              <a:rPr lang="en-US" sz="1200" b="1" dirty="0" smtClean="0">
+              <a:rPr lang="en-US" sz="1200" b="1" dirty="0">
                 <a:latin typeface="Arial" panose="020B0604020202020204" pitchFamily="34" charset="0"/>
                 <a:cs typeface="Arial" panose="020B0604020202020204" pitchFamily="34" charset="0"/>
               </a:rPr>
@@ -3769,7 +3730,7 @@
           <a:lstStyle/>
           <a:p>
             <a:r>
-              <a:rPr lang="en-US" sz="1200" b="1" dirty="0" smtClean="0">
+              <a:rPr lang="en-US" sz="1200" b="1" dirty="0">
                 <a:latin typeface="Arial" panose="020B0604020202020204" pitchFamily="34" charset="0"/>
                 <a:cs typeface="Arial" panose="020B0604020202020204" pitchFamily="34" charset="0"/>
               </a:rPr>
@@ -3829,7 +3790,7 @@
           <a:lstStyle/>
           <a:p>
             <a:r>
-              <a:rPr lang="en-US" sz="1200" b="1" dirty="0" smtClean="0">
+              <a:rPr lang="en-US" sz="1200" b="1" dirty="0">
                 <a:latin typeface="Arial" panose="020B0604020202020204" pitchFamily="34" charset="0"/>
                 <a:cs typeface="Arial" panose="020B0604020202020204" pitchFamily="34" charset="0"/>
               </a:rPr>
@@ -3850,7 +3811,7 @@
         </p:nvSpPr>
         <p:spPr>
           <a:xfrm>
-            <a:off x="4944973" y="885876"/>
+            <a:off x="4949727" y="913813"/>
             <a:ext cx="2061839" cy="369332"/>
           </a:xfrm>
           <a:prstGeom prst="rect">
@@ -3869,19 +3830,8 @@
                 <a:latin typeface="Arial" panose="020B0604020202020204" pitchFamily="34" charset="0"/>
                 <a:cs typeface="Arial" panose="020B0604020202020204" pitchFamily="34" charset="0"/>
               </a:rPr>
-              <a:t>Option 1: </a:t>
-            </a:r>
-            <a:r>
-              <a:rPr lang="en-US" sz="900" dirty="0" smtClean="0">
-                <a:latin typeface="Arial" panose="020B0604020202020204" pitchFamily="34" charset="0"/>
-                <a:cs typeface="Arial" panose="020B0604020202020204" pitchFamily="34" charset="0"/>
-              </a:rPr>
-              <a:t>2.5mm spring + 2 elastomers</a:t>
-            </a:r>
-            <a:endParaRPr lang="en-US" sz="900" dirty="0">
-              <a:latin typeface="Arial" panose="020B0604020202020204" pitchFamily="34" charset="0"/>
-              <a:cs typeface="Arial" panose="020B0604020202020204" pitchFamily="34" charset="0"/>
-            </a:endParaRPr>
+              <a:t>Option 1 stiffest: 2.5mm spring + 2 elastomers</a:t>
+            </a:r>
           </a:p>
         </p:txBody>
       </p:sp>
@@ -3893,8 +3843,8 @@
         </p:nvSpPr>
         <p:spPr>
           <a:xfrm>
-            <a:off x="4927398" y="1645743"/>
-            <a:ext cx="2079415" cy="230832"/>
+            <a:off x="4925186" y="1675316"/>
+            <a:ext cx="2393604" cy="230832"/>
           </a:xfrm>
           <a:prstGeom prst="rect">
             <a:avLst/>
@@ -3911,19 +3861,8 @@
                 <a:latin typeface="Arial" panose="020B0604020202020204" pitchFamily="34" charset="0"/>
                 <a:cs typeface="Arial" panose="020B0604020202020204" pitchFamily="34" charset="0"/>
               </a:rPr>
-              <a:t>Option </a:t>
-            </a:r>
-            <a:r>
-              <a:rPr lang="en-US" sz="900" dirty="0" smtClean="0">
-                <a:latin typeface="Arial" panose="020B0604020202020204" pitchFamily="34" charset="0"/>
-                <a:cs typeface="Arial" panose="020B0604020202020204" pitchFamily="34" charset="0"/>
-              </a:rPr>
-              <a:t>2: 3mm spring + 2 elastomers</a:t>
-            </a:r>
-            <a:endParaRPr lang="en-US" sz="900" dirty="0">
-              <a:latin typeface="Arial" panose="020B0604020202020204" pitchFamily="34" charset="0"/>
-              <a:cs typeface="Arial" panose="020B0604020202020204" pitchFamily="34" charset="0"/>
-            </a:endParaRPr>
+              <a:t>Option 2 stiffer: 3mm spring + 2 elastomers</a:t>
+            </a:r>
           </a:p>
         </p:txBody>
       </p:sp>
@@ -3953,19 +3892,8 @@
                 <a:latin typeface="Arial" panose="020B0604020202020204" pitchFamily="34" charset="0"/>
                 <a:cs typeface="Arial" panose="020B0604020202020204" pitchFamily="34" charset="0"/>
               </a:rPr>
-              <a:t>Option </a:t>
-            </a:r>
-            <a:r>
-              <a:rPr lang="en-US" sz="900" dirty="0" smtClean="0">
-                <a:latin typeface="Arial" panose="020B0604020202020204" pitchFamily="34" charset="0"/>
-                <a:cs typeface="Arial" panose="020B0604020202020204" pitchFamily="34" charset="0"/>
-              </a:rPr>
-              <a:t>3: 2.5mm spring + 3mm spring + 1 elastomer</a:t>
-            </a:r>
-            <a:endParaRPr lang="en-US" sz="900" dirty="0">
-              <a:latin typeface="Arial" panose="020B0604020202020204" pitchFamily="34" charset="0"/>
-              <a:cs typeface="Arial" panose="020B0604020202020204" pitchFamily="34" charset="0"/>
-            </a:endParaRPr>
+              <a:t>Option 3 soft: 2.5mm spring + 3mm spring + 1 elastomer</a:t>
+            </a:r>
           </a:p>
         </p:txBody>
       </p:sp>
@@ -4015,30 +3943,12 @@
           <a:lstStyle/>
           <a:p>
             <a:r>
-              <a:rPr lang="en-US" sz="900" dirty="0" smtClean="0">
-                <a:latin typeface="Arial" panose="020B0604020202020204" pitchFamily="34" charset="0"/>
-                <a:cs typeface="Arial" panose="020B0604020202020204" pitchFamily="34" charset="0"/>
-              </a:rPr>
-              <a:t>Step 6.2</a:t>
-            </a:r>
-            <a:r>
               <a:rPr lang="en-US" sz="900" dirty="0">
                 <a:latin typeface="Arial" panose="020B0604020202020204" pitchFamily="34" charset="0"/>
                 <a:cs typeface="Arial" panose="020B0604020202020204" pitchFamily="34" charset="0"/>
               </a:rPr>
-              <a:t>: </a:t>
-            </a:r>
-            <a:r>
-              <a:rPr lang="en-US" sz="900" dirty="0" smtClean="0">
-                <a:latin typeface="Arial" panose="020B0604020202020204" pitchFamily="34" charset="0"/>
-                <a:cs typeface="Arial" panose="020B0604020202020204" pitchFamily="34" charset="0"/>
-              </a:rPr>
-              <a:t>Remove the spacer.</a:t>
-            </a:r>
-            <a:endParaRPr lang="en-US" sz="900" dirty="0">
-              <a:latin typeface="Arial" panose="020B0604020202020204" pitchFamily="34" charset="0"/>
-              <a:cs typeface="Arial" panose="020B0604020202020204" pitchFamily="34" charset="0"/>
-            </a:endParaRPr>
+              <a:t>Step 6.2: Remove the spacer.</a:t>
+            </a:r>
           </a:p>
         </p:txBody>
       </p:sp>
@@ -4099,30 +4009,12 @@
           <a:lstStyle/>
           <a:p>
             <a:r>
-              <a:rPr lang="en-US" sz="900" dirty="0" smtClean="0">
-                <a:latin typeface="Arial" panose="020B0604020202020204" pitchFamily="34" charset="0"/>
-                <a:cs typeface="Arial" panose="020B0604020202020204" pitchFamily="34" charset="0"/>
-              </a:rPr>
-              <a:t>Step 6.1</a:t>
-            </a:r>
-            <a:r>
               <a:rPr lang="en-US" sz="900" dirty="0">
                 <a:latin typeface="Arial" panose="020B0604020202020204" pitchFamily="34" charset="0"/>
                 <a:cs typeface="Arial" panose="020B0604020202020204" pitchFamily="34" charset="0"/>
               </a:rPr>
-              <a:t>: </a:t>
-            </a:r>
-            <a:r>
-              <a:rPr lang="en-US" sz="900" dirty="0" smtClean="0">
-                <a:latin typeface="Arial" panose="020B0604020202020204" pitchFamily="34" charset="0"/>
-                <a:cs typeface="Arial" panose="020B0604020202020204" pitchFamily="34" charset="0"/>
-              </a:rPr>
-              <a:t>Fix the damper in place by screwing in the plastic- headed grub screw</a:t>
-            </a:r>
-            <a:endParaRPr lang="en-US" sz="900" dirty="0">
-              <a:latin typeface="Arial" panose="020B0604020202020204" pitchFamily="34" charset="0"/>
-              <a:cs typeface="Arial" panose="020B0604020202020204" pitchFamily="34" charset="0"/>
-            </a:endParaRPr>
+              <a:t>Step 6.1: Fix the damper in place by screwing in the plastic- headed grub screw</a:t>
+            </a:r>
           </a:p>
         </p:txBody>
       </p:sp>
@@ -4183,30 +4075,12 @@
           <a:lstStyle/>
           <a:p>
             <a:r>
-              <a:rPr lang="en-US" sz="900" dirty="0" smtClean="0">
-                <a:latin typeface="Arial" panose="020B0604020202020204" pitchFamily="34" charset="0"/>
-                <a:cs typeface="Arial" panose="020B0604020202020204" pitchFamily="34" charset="0"/>
-              </a:rPr>
-              <a:t>Step 5.1</a:t>
-            </a:r>
-            <a:r>
               <a:rPr lang="en-US" sz="900" dirty="0">
                 <a:latin typeface="Arial" panose="020B0604020202020204" pitchFamily="34" charset="0"/>
                 <a:cs typeface="Arial" panose="020B0604020202020204" pitchFamily="34" charset="0"/>
               </a:rPr>
-              <a:t>: </a:t>
-            </a:r>
-            <a:r>
-              <a:rPr lang="en-US" sz="900" dirty="0" smtClean="0">
-                <a:latin typeface="Arial" panose="020B0604020202020204" pitchFamily="34" charset="0"/>
-                <a:cs typeface="Arial" panose="020B0604020202020204" pitchFamily="34" charset="0"/>
-              </a:rPr>
-              <a:t>Insert the 3D printed spacer.</a:t>
-            </a:r>
-            <a:endParaRPr lang="en-US" sz="900" dirty="0">
-              <a:latin typeface="Arial" panose="020B0604020202020204" pitchFamily="34" charset="0"/>
-              <a:cs typeface="Arial" panose="020B0604020202020204" pitchFamily="34" charset="0"/>
-            </a:endParaRPr>
+              <a:t>Step 5.1: Insert the 3D printed spacer.</a:t>
+            </a:r>
           </a:p>
         </p:txBody>
       </p:sp>
@@ -4267,30 +4141,12 @@
           <a:lstStyle/>
           <a:p>
             <a:r>
-              <a:rPr lang="en-US" sz="900" dirty="0" smtClean="0">
-                <a:latin typeface="Arial" panose="020B0604020202020204" pitchFamily="34" charset="0"/>
-                <a:cs typeface="Arial" panose="020B0604020202020204" pitchFamily="34" charset="0"/>
-              </a:rPr>
-              <a:t>Step 5.2</a:t>
-            </a:r>
-            <a:r>
               <a:rPr lang="en-US" sz="900" dirty="0">
                 <a:latin typeface="Arial" panose="020B0604020202020204" pitchFamily="34" charset="0"/>
                 <a:cs typeface="Arial" panose="020B0604020202020204" pitchFamily="34" charset="0"/>
               </a:rPr>
-              <a:t>: </a:t>
-            </a:r>
-            <a:r>
-              <a:rPr lang="en-US" sz="900" dirty="0" smtClean="0">
-                <a:latin typeface="Arial" panose="020B0604020202020204" pitchFamily="34" charset="0"/>
-                <a:cs typeface="Arial" panose="020B0604020202020204" pitchFamily="34" charset="0"/>
-              </a:rPr>
-              <a:t>Tighten the whole damper until it touches the spacer</a:t>
-            </a:r>
-            <a:endParaRPr lang="en-US" sz="900" dirty="0">
-              <a:latin typeface="Arial" panose="020B0604020202020204" pitchFamily="34" charset="0"/>
-              <a:cs typeface="Arial" panose="020B0604020202020204" pitchFamily="34" charset="0"/>
-            </a:endParaRPr>
+              <a:t>Step 5.2: Tighten the whole damper until it touches the spacer</a:t>
+            </a:r>
           </a:p>
         </p:txBody>
       </p:sp>
@@ -4352,16 +4208,12 @@
           <a:lstStyle/>
           <a:p>
             <a:r>
-              <a:rPr lang="en-US" sz="900" dirty="0" smtClean="0">
+              <a:rPr lang="en-US" sz="900" dirty="0">
                 <a:latin typeface="Arial" panose="020B0604020202020204" pitchFamily="34" charset="0"/>
                 <a:cs typeface="Arial" panose="020B0604020202020204" pitchFamily="34" charset="0"/>
               </a:rPr>
               <a:t>Twist the damper into the large threaded hole </a:t>
             </a:r>
-            <a:endParaRPr lang="en-US" sz="900" dirty="0">
-              <a:latin typeface="Arial" panose="020B0604020202020204" pitchFamily="34" charset="0"/>
-              <a:cs typeface="Arial" panose="020B0604020202020204" pitchFamily="34" charset="0"/>
-            </a:endParaRPr>
           </a:p>
         </p:txBody>
       </p:sp>
@@ -4422,16 +4274,12 @@
           <a:lstStyle/>
           <a:p>
             <a:r>
-              <a:rPr lang="en-US" sz="900" dirty="0" smtClean="0">
+              <a:rPr lang="en-US" sz="900" dirty="0">
                 <a:latin typeface="Arial" panose="020B0604020202020204" pitchFamily="34" charset="0"/>
                 <a:cs typeface="Arial" panose="020B0604020202020204" pitchFamily="34" charset="0"/>
               </a:rPr>
               <a:t>Insert the piston shaft into the hole and tighten with the grub screw</a:t>
             </a:r>
-            <a:endParaRPr lang="en-US" sz="900" dirty="0">
-              <a:latin typeface="Arial" panose="020B0604020202020204" pitchFamily="34" charset="0"/>
-              <a:cs typeface="Arial" panose="020B0604020202020204" pitchFamily="34" charset="0"/>
-            </a:endParaRPr>
           </a:p>
         </p:txBody>
       </p:sp>
@@ -4540,16 +4388,12 @@
           <a:lstStyle/>
           <a:p>
             <a:r>
-              <a:rPr lang="en-US" sz="900" dirty="0" smtClean="0">
+              <a:rPr lang="en-US" sz="900" dirty="0">
                 <a:latin typeface="Arial" panose="020B0604020202020204" pitchFamily="34" charset="0"/>
                 <a:cs typeface="Arial" panose="020B0604020202020204" pitchFamily="34" charset="0"/>
               </a:rPr>
               <a:t>Damper</a:t>
             </a:r>
-            <a:endParaRPr lang="en-US" sz="900" dirty="0">
-              <a:latin typeface="Arial" panose="020B0604020202020204" pitchFamily="34" charset="0"/>
-              <a:cs typeface="Arial" panose="020B0604020202020204" pitchFamily="34" charset="0"/>
-            </a:endParaRPr>
           </a:p>
         </p:txBody>
       </p:sp>
@@ -4575,16 +4419,12 @@
           <a:lstStyle/>
           <a:p>
             <a:r>
-              <a:rPr lang="en-US" sz="900" dirty="0" smtClean="0">
+              <a:rPr lang="en-US" sz="900" dirty="0">
                 <a:latin typeface="Arial" panose="020B0604020202020204" pitchFamily="34" charset="0"/>
                 <a:cs typeface="Arial" panose="020B0604020202020204" pitchFamily="34" charset="0"/>
               </a:rPr>
               <a:t>3D printed spacer</a:t>
             </a:r>
-            <a:endParaRPr lang="en-US" sz="900" dirty="0">
-              <a:latin typeface="Arial" panose="020B0604020202020204" pitchFamily="34" charset="0"/>
-              <a:cs typeface="Arial" panose="020B0604020202020204" pitchFamily="34" charset="0"/>
-            </a:endParaRPr>
           </a:p>
         </p:txBody>
       </p:sp>
@@ -4634,16 +4474,12 @@
           <a:lstStyle/>
           <a:p>
             <a:r>
-              <a:rPr lang="en-US" sz="900" dirty="0" smtClean="0">
+              <a:rPr lang="en-US" sz="900" dirty="0">
                 <a:latin typeface="Arial" panose="020B0604020202020204" pitchFamily="34" charset="0"/>
                 <a:cs typeface="Arial" panose="020B0604020202020204" pitchFamily="34" charset="0"/>
               </a:rPr>
               <a:t>M5x6 flat-headed grub screw</a:t>
             </a:r>
-            <a:endParaRPr lang="en-US" sz="900" dirty="0">
-              <a:latin typeface="Arial" panose="020B0604020202020204" pitchFamily="34" charset="0"/>
-              <a:cs typeface="Arial" panose="020B0604020202020204" pitchFamily="34" charset="0"/>
-            </a:endParaRPr>
           </a:p>
         </p:txBody>
       </p:sp>
@@ -4693,16 +4529,12 @@
           <a:lstStyle/>
           <a:p>
             <a:r>
-              <a:rPr lang="en-US" sz="900" dirty="0" smtClean="0">
+              <a:rPr lang="en-US" sz="900" dirty="0">
                 <a:latin typeface="Arial" panose="020B0604020202020204" pitchFamily="34" charset="0"/>
                 <a:cs typeface="Arial" panose="020B0604020202020204" pitchFamily="34" charset="0"/>
               </a:rPr>
               <a:t>M5x4 plastic-headed grub screw</a:t>
             </a:r>
-            <a:endParaRPr lang="en-US" sz="900" dirty="0">
-              <a:latin typeface="Arial" panose="020B0604020202020204" pitchFamily="34" charset="0"/>
-              <a:cs typeface="Arial" panose="020B0604020202020204" pitchFamily="34" charset="0"/>
-            </a:endParaRPr>
           </a:p>
         </p:txBody>
       </p:sp>
@@ -4728,31 +4560,13 @@
           </a:bodyPr>
           <a:lstStyle/>
           <a:p>
-            <a:r>
-              <a:rPr lang="en-US" sz="1200" b="1" dirty="0" smtClean="0">
-                <a:latin typeface="Arial" panose="020B0604020202020204" pitchFamily="34" charset="0"/>
-                <a:cs typeface="Arial" panose="020B0604020202020204" pitchFamily="34" charset="0"/>
-              </a:rPr>
-              <a:t>Parts needed to install the damper to your </a:t>
-            </a:r>
             <a:r>
               <a:rPr lang="en-US" sz="1200" b="1" dirty="0">
                 <a:latin typeface="Arial" panose="020B0604020202020204" pitchFamily="34" charset="0"/>
                 <a:cs typeface="Arial" panose="020B0604020202020204" pitchFamily="34" charset="0"/>
               </a:rPr>
-              <a:t>B</a:t>
-            </a:r>
-            <a:r>
-              <a:rPr lang="en-US" sz="1200" b="1" dirty="0" smtClean="0">
-                <a:latin typeface="Arial" panose="020B0604020202020204" pitchFamily="34" charset="0"/>
-                <a:cs typeface="Arial" panose="020B0604020202020204" pitchFamily="34" charset="0"/>
-              </a:rPr>
-              <a:t>rake unit</a:t>
-            </a:r>
-            <a:endParaRPr lang="en-US" sz="1200" b="1" dirty="0">
-              <a:latin typeface="Arial" panose="020B0604020202020204" pitchFamily="34" charset="0"/>
-              <a:cs typeface="Arial" panose="020B0604020202020204" pitchFamily="34" charset="0"/>
-            </a:endParaRPr>
+              <a:t>Parts needed to install the damper to your Brake unit</a:t>
+            </a:r>
           </a:p>
         </p:txBody>
       </p:sp>
@@ -4811,16 +4625,12 @@
           <a:lstStyle/>
           <a:p>
             <a:r>
-              <a:rPr lang="en-US" sz="900" dirty="0" smtClean="0">
+              <a:rPr lang="en-US" sz="900" dirty="0">
                 <a:latin typeface="Arial" panose="020B0604020202020204" pitchFamily="34" charset="0"/>
                 <a:cs typeface="Arial" panose="020B0604020202020204" pitchFamily="34" charset="0"/>
               </a:rPr>
               <a:t>Reinstall the stack and adjust the preload to your liking. </a:t>
             </a:r>
-            <a:endParaRPr lang="en-US" sz="900" dirty="0">
-              <a:latin typeface="Arial" panose="020B0604020202020204" pitchFamily="34" charset="0"/>
-              <a:cs typeface="Arial" panose="020B0604020202020204" pitchFamily="34" charset="0"/>
-            </a:endParaRPr>
           </a:p>
         </p:txBody>
       </p:sp>
@@ -4948,30 +4758,26 @@
           <a:lstStyle/>
           <a:p>
             <a:r>
-              <a:rPr lang="en-US" sz="900" dirty="0" smtClean="0">
+              <a:rPr lang="en-US" sz="900" dirty="0">
                 <a:latin typeface="Arial" panose="020B0604020202020204" pitchFamily="34" charset="0"/>
                 <a:cs typeface="Arial" panose="020B0604020202020204" pitchFamily="34" charset="0"/>
               </a:rPr>
               <a:t>Remove the 2 hex bolts on the sides, push the pedal arm backwards and slide the blue </a:t>
             </a:r>
             <a:r>
-              <a:rPr lang="en-US" sz="900" dirty="0" err="1" smtClean="0">
+              <a:rPr lang="en-US" sz="900" dirty="0" err="1">
                 <a:latin typeface="Arial" panose="020B0604020202020204" pitchFamily="34" charset="0"/>
                 <a:cs typeface="Arial" panose="020B0604020202020204" pitchFamily="34" charset="0"/>
               </a:rPr>
               <a:t>bumpstop</a:t>
             </a:r>
             <a:r>
-              <a:rPr lang="en-US" sz="900" dirty="0" smtClean="0">
+              <a:rPr lang="en-US" sz="900" dirty="0">
                 <a:latin typeface="Arial" panose="020B0604020202020204" pitchFamily="34" charset="0"/>
                 <a:cs typeface="Arial" panose="020B0604020202020204" pitchFamily="34" charset="0"/>
               </a:rPr>
               <a:t> downwards</a:t>
             </a:r>
-            <a:endParaRPr lang="en-US" sz="900" dirty="0">
-              <a:latin typeface="Arial" panose="020B0604020202020204" pitchFamily="34" charset="0"/>
-              <a:cs typeface="Arial" panose="020B0604020202020204" pitchFamily="34" charset="0"/>
-            </a:endParaRPr>
           </a:p>
         </p:txBody>
       </p:sp>
@@ -5196,25 +5002,25 @@
         </p:nvSpPr>
         <p:spPr>
           <a:xfrm>
-            <a:off x="4825606" y="624927"/>
-            <a:ext cx="2282997" cy="261610"/>
+            <a:off x="4837676" y="495481"/>
+            <a:ext cx="2323175" cy="507831"/>
           </a:xfrm>
           <a:prstGeom prst="rect">
             <a:avLst/>
           </a:prstGeom>
         </p:spPr>
         <p:txBody>
-          <a:bodyPr wrap="none">
+          <a:bodyPr wrap="square">
             <a:spAutoFit/>
           </a:bodyPr>
           <a:lstStyle/>
           <a:p>
             <a:r>
-              <a:rPr lang="en-US" sz="1100" dirty="0">
+              <a:rPr lang="en-US" sz="900" dirty="0">
                 <a:latin typeface="Arial" panose="020B0604020202020204" pitchFamily="34" charset="0"/>
                 <a:cs typeface="Arial" panose="020B0604020202020204" pitchFamily="34" charset="0"/>
               </a:rPr>
-              <a:t>3 combination are recommended:</a:t>
+              <a:t>3 combinations are recommended but feel free to mix and match to find the perfect combo for you:</a:t>
             </a:r>
           </a:p>
         </p:txBody>

</xml_diff>